<commit_message>
One missing, one with slight mod
git-svn-id: http://svn.eol.ucar.edu/svn/raf/trunk/instruments/mtp@8259 640d5228-2204-0410-8d71-8f46fa6850b4
</commit_message>
<xml_diff>
--- a/doc/MTP_Status_20150826.pptx
+++ b/doc/MTP_Status_20150826.pptx
@@ -297,7 +297,7 @@
           <a:p>
             <a:fld id="{B12E8006-143C-4A72-ABC2-91D95DCCCAE8}" type="datetimeFigureOut">
               <a:rPr lang="en-US" smtClean="0"/>
-              <a:t>8/25/2015</a:t>
+              <a:t>3/15/2016</a:t>
             </a:fld>
             <a:endParaRPr lang="en-US"/>
           </a:p>
@@ -467,7 +467,7 @@
           <a:p>
             <a:fld id="{B12E8006-143C-4A72-ABC2-91D95DCCCAE8}" type="datetimeFigureOut">
               <a:rPr lang="en-US" smtClean="0"/>
-              <a:t>8/25/2015</a:t>
+              <a:t>3/15/2016</a:t>
             </a:fld>
             <a:endParaRPr lang="en-US"/>
           </a:p>
@@ -647,7 +647,7 @@
           <a:p>
             <a:fld id="{B12E8006-143C-4A72-ABC2-91D95DCCCAE8}" type="datetimeFigureOut">
               <a:rPr lang="en-US" smtClean="0"/>
-              <a:t>8/25/2015</a:t>
+              <a:t>3/15/2016</a:t>
             </a:fld>
             <a:endParaRPr lang="en-US"/>
           </a:p>
@@ -817,7 +817,7 @@
           <a:p>
             <a:fld id="{B12E8006-143C-4A72-ABC2-91D95DCCCAE8}" type="datetimeFigureOut">
               <a:rPr lang="en-US" smtClean="0"/>
-              <a:t>8/25/2015</a:t>
+              <a:t>3/15/2016</a:t>
             </a:fld>
             <a:endParaRPr lang="en-US"/>
           </a:p>
@@ -1063,7 +1063,7 @@
           <a:p>
             <a:fld id="{B12E8006-143C-4A72-ABC2-91D95DCCCAE8}" type="datetimeFigureOut">
               <a:rPr lang="en-US" smtClean="0"/>
-              <a:t>8/25/2015</a:t>
+              <a:t>3/15/2016</a:t>
             </a:fld>
             <a:endParaRPr lang="en-US"/>
           </a:p>
@@ -1351,7 +1351,7 @@
           <a:p>
             <a:fld id="{B12E8006-143C-4A72-ABC2-91D95DCCCAE8}" type="datetimeFigureOut">
               <a:rPr lang="en-US" smtClean="0"/>
-              <a:t>8/25/2015</a:t>
+              <a:t>3/15/2016</a:t>
             </a:fld>
             <a:endParaRPr lang="en-US"/>
           </a:p>
@@ -1773,7 +1773,7 @@
           <a:p>
             <a:fld id="{B12E8006-143C-4A72-ABC2-91D95DCCCAE8}" type="datetimeFigureOut">
               <a:rPr lang="en-US" smtClean="0"/>
-              <a:t>8/25/2015</a:t>
+              <a:t>3/15/2016</a:t>
             </a:fld>
             <a:endParaRPr lang="en-US"/>
           </a:p>
@@ -1891,7 +1891,7 @@
           <a:p>
             <a:fld id="{B12E8006-143C-4A72-ABC2-91D95DCCCAE8}" type="datetimeFigureOut">
               <a:rPr lang="en-US" smtClean="0"/>
-              <a:t>8/25/2015</a:t>
+              <a:t>3/15/2016</a:t>
             </a:fld>
             <a:endParaRPr lang="en-US"/>
           </a:p>
@@ -1986,7 +1986,7 @@
           <a:p>
             <a:fld id="{B12E8006-143C-4A72-ABC2-91D95DCCCAE8}" type="datetimeFigureOut">
               <a:rPr lang="en-US" smtClean="0"/>
-              <a:t>8/25/2015</a:t>
+              <a:t>3/15/2016</a:t>
             </a:fld>
             <a:endParaRPr lang="en-US"/>
           </a:p>
@@ -2263,7 +2263,7 @@
           <a:p>
             <a:fld id="{B12E8006-143C-4A72-ABC2-91D95DCCCAE8}" type="datetimeFigureOut">
               <a:rPr lang="en-US" smtClean="0"/>
-              <a:t>8/25/2015</a:t>
+              <a:t>3/15/2016</a:t>
             </a:fld>
             <a:endParaRPr lang="en-US"/>
           </a:p>
@@ -2516,7 +2516,7 @@
           <a:p>
             <a:fld id="{B12E8006-143C-4A72-ABC2-91D95DCCCAE8}" type="datetimeFigureOut">
               <a:rPr lang="en-US" smtClean="0"/>
-              <a:t>8/25/2015</a:t>
+              <a:t>3/15/2016</a:t>
             </a:fld>
             <a:endParaRPr lang="en-US"/>
           </a:p>
@@ -2729,7 +2729,7 @@
           <a:p>
             <a:fld id="{B12E8006-143C-4A72-ABC2-91D95DCCCAE8}" type="datetimeFigureOut">
               <a:rPr lang="en-US" smtClean="0"/>
-              <a:t>8/25/2015</a:t>
+              <a:t>3/15/2016</a:t>
             </a:fld>
             <a:endParaRPr lang="en-US"/>
           </a:p>
@@ -3141,6 +3141,12 @@
         <p:txBody>
           <a:bodyPr/>
           <a:lstStyle/>
+          <a:p>
+            <a:r>
+              <a:rPr lang="en-US" dirty="0" smtClean="0"/>
+              <a:t>Aug 26, 2015</a:t>
+            </a:r>
+          </a:p>
           <a:p>
             <a:endParaRPr lang="en-US" dirty="0"/>
           </a:p>

</xml_diff>